<commit_message>
removed reference to NOAA and changed to NCEI.
</commit_message>
<xml_diff>
--- a/docs/Solar Irradiance Data Flow Diagram Final mod.pptx
+++ b/docs/Solar Irradiance Data Flow Diagram Final mod.pptx
@@ -288,7 +288,7 @@
           <a:p>
             <a:fld id="{189C42EF-6D7F-464F-AB42-8CE5ED0E041E}" type="datetimeFigureOut">
               <a:rPr lang="en-US" smtClean="0"/>
-              <a:t>4/3/15</a:t>
+              <a:t>9/4/15</a:t>
             </a:fld>
             <a:endParaRPr lang="en-US"/>
           </a:p>
@@ -458,7 +458,7 @@
           <a:p>
             <a:fld id="{189C42EF-6D7F-464F-AB42-8CE5ED0E041E}" type="datetimeFigureOut">
               <a:rPr lang="en-US" smtClean="0"/>
-              <a:t>4/3/15</a:t>
+              <a:t>9/4/15</a:t>
             </a:fld>
             <a:endParaRPr lang="en-US"/>
           </a:p>
@@ -638,7 +638,7 @@
           <a:p>
             <a:fld id="{189C42EF-6D7F-464F-AB42-8CE5ED0E041E}" type="datetimeFigureOut">
               <a:rPr lang="en-US" smtClean="0"/>
-              <a:t>4/3/15</a:t>
+              <a:t>9/4/15</a:t>
             </a:fld>
             <a:endParaRPr lang="en-US"/>
           </a:p>
@@ -808,7 +808,7 @@
           <a:p>
             <a:fld id="{189C42EF-6D7F-464F-AB42-8CE5ED0E041E}" type="datetimeFigureOut">
               <a:rPr lang="en-US" smtClean="0"/>
-              <a:t>4/3/15</a:t>
+              <a:t>9/4/15</a:t>
             </a:fld>
             <a:endParaRPr lang="en-US"/>
           </a:p>
@@ -1054,7 +1054,7 @@
           <a:p>
             <a:fld id="{189C42EF-6D7F-464F-AB42-8CE5ED0E041E}" type="datetimeFigureOut">
               <a:rPr lang="en-US" smtClean="0"/>
-              <a:t>4/3/15</a:t>
+              <a:t>9/4/15</a:t>
             </a:fld>
             <a:endParaRPr lang="en-US"/>
           </a:p>
@@ -1342,7 +1342,7 @@
           <a:p>
             <a:fld id="{189C42EF-6D7F-464F-AB42-8CE5ED0E041E}" type="datetimeFigureOut">
               <a:rPr lang="en-US" smtClean="0"/>
-              <a:t>4/3/15</a:t>
+              <a:t>9/4/15</a:t>
             </a:fld>
             <a:endParaRPr lang="en-US"/>
           </a:p>
@@ -1764,7 +1764,7 @@
           <a:p>
             <a:fld id="{189C42EF-6D7F-464F-AB42-8CE5ED0E041E}" type="datetimeFigureOut">
               <a:rPr lang="en-US" smtClean="0"/>
-              <a:t>4/3/15</a:t>
+              <a:t>9/4/15</a:t>
             </a:fld>
             <a:endParaRPr lang="en-US"/>
           </a:p>
@@ -1882,7 +1882,7 @@
           <a:p>
             <a:fld id="{189C42EF-6D7F-464F-AB42-8CE5ED0E041E}" type="datetimeFigureOut">
               <a:rPr lang="en-US" smtClean="0"/>
-              <a:t>4/3/15</a:t>
+              <a:t>9/4/15</a:t>
             </a:fld>
             <a:endParaRPr lang="en-US"/>
           </a:p>
@@ -1977,7 +1977,7 @@
           <a:p>
             <a:fld id="{189C42EF-6D7F-464F-AB42-8CE5ED0E041E}" type="datetimeFigureOut">
               <a:rPr lang="en-US" smtClean="0"/>
-              <a:t>4/3/15</a:t>
+              <a:t>9/4/15</a:t>
             </a:fld>
             <a:endParaRPr lang="en-US"/>
           </a:p>
@@ -2254,7 +2254,7 @@
           <a:p>
             <a:fld id="{189C42EF-6D7F-464F-AB42-8CE5ED0E041E}" type="datetimeFigureOut">
               <a:rPr lang="en-US" smtClean="0"/>
-              <a:t>4/3/15</a:t>
+              <a:t>9/4/15</a:t>
             </a:fld>
             <a:endParaRPr lang="en-US"/>
           </a:p>
@@ -2507,7 +2507,7 @@
           <a:p>
             <a:fld id="{189C42EF-6D7F-464F-AB42-8CE5ED0E041E}" type="datetimeFigureOut">
               <a:rPr lang="en-US" smtClean="0"/>
-              <a:t>4/3/15</a:t>
+              <a:t>9/4/15</a:t>
             </a:fld>
             <a:endParaRPr lang="en-US"/>
           </a:p>
@@ -2720,7 +2720,7 @@
           <a:p>
             <a:fld id="{189C42EF-6D7F-464F-AB42-8CE5ED0E041E}" type="datetimeFigureOut">
               <a:rPr lang="en-US" smtClean="0"/>
-              <a:t>4/3/15</a:t>
+              <a:t>9/4/15</a:t>
             </a:fld>
             <a:endParaRPr lang="en-US"/>
           </a:p>
@@ -3348,7 +3348,7 @@
             </a:r>
             <a:r>
               <a:rPr lang="en-US" sz="1200" dirty="0" smtClean="0"/>
-              <a:t>NGDC</a:t>
+              <a:t>NCEI</a:t>
             </a:r>
             <a:endParaRPr lang="en-US" sz="1200" dirty="0"/>
           </a:p>
@@ -3554,8 +3554,25 @@
             <a:pPr algn="ctr"/>
             <a:r>
               <a:rPr lang="en-US" dirty="0" smtClean="0"/>
-              <a:t>Facular Brightening Function (PX)</a:t>
-            </a:r>
+              <a:t>Facular Brightening Function </a:t>
+            </a:r>
+            <a:r>
+              <a:rPr lang="en-US" i="1" dirty="0" smtClean="0"/>
+              <a:t>F</a:t>
+            </a:r>
+            <a:r>
+              <a:rPr lang="en-US" dirty="0" smtClean="0"/>
+              <a:t>(</a:t>
+            </a:r>
+            <a:r>
+              <a:rPr lang="en-US" i="1" dirty="0" smtClean="0"/>
+              <a:t>t</a:t>
+            </a:r>
+            <a:r>
+              <a:rPr lang="en-US" dirty="0" smtClean="0"/>
+              <a:t>)</a:t>
+            </a:r>
+            <a:endParaRPr lang="en-US" i="1" dirty="0" smtClean="0"/>
           </a:p>
         </p:txBody>
       </p:sp>
@@ -3589,7 +3606,23 @@
             <a:pPr algn="ctr"/>
             <a:r>
               <a:rPr lang="en-US" dirty="0" smtClean="0"/>
-              <a:t>Sunspot Blocking Function (PS)</a:t>
+              <a:t>Sunspot Blocking Function </a:t>
+            </a:r>
+            <a:r>
+              <a:rPr lang="en-US" i="1" dirty="0" smtClean="0"/>
+              <a:t>S</a:t>
+            </a:r>
+            <a:r>
+              <a:rPr lang="en-US" dirty="0" smtClean="0"/>
+              <a:t>(</a:t>
+            </a:r>
+            <a:r>
+              <a:rPr lang="en-US" i="1" dirty="0"/>
+              <a:t>t</a:t>
+            </a:r>
+            <a:r>
+              <a:rPr lang="en-US" dirty="0"/>
+              <a:t>)</a:t>
             </a:r>
             <a:endParaRPr lang="en-US" sz="1200" dirty="0"/>
           </a:p>
@@ -3792,13 +3825,8 @@
           <a:p>
             <a:r>
               <a:rPr lang="en-US" u="sng" dirty="0" smtClean="0"/>
-              <a:t>Compute Model Inputs</a:t>
-            </a:r>
-            <a:r>
-              <a:rPr lang="en-US" u="sng" dirty="0" smtClean="0"/>
-              <a:t>:</a:t>
-            </a:r>
-            <a:endParaRPr lang="en-US" u="sng" dirty="0" smtClean="0"/>
+              <a:t>Compute Model Inputs:</a:t>
+            </a:r>
           </a:p>
         </p:txBody>
       </p:sp>
@@ -3874,13 +3902,8 @@
           <a:p>
             <a:r>
               <a:rPr lang="en-US" u="sng" dirty="0" smtClean="0"/>
-              <a:t>Generate Output Files</a:t>
-            </a:r>
-            <a:r>
-              <a:rPr lang="en-US" u="sng" dirty="0" smtClean="0"/>
-              <a:t>:</a:t>
-            </a:r>
-            <a:endParaRPr lang="en-US" u="sng" dirty="0" smtClean="0"/>
+              <a:t>Generate Output Files:</a:t>
+            </a:r>
           </a:p>
         </p:txBody>
       </p:sp>
@@ -4127,7 +4150,51 @@
             <a:pPr algn="ctr"/>
             <a:r>
               <a:rPr lang="en-US" dirty="0" smtClean="0"/>
-              <a:t>Scaling Factors convert PX and PS to Irradiance Changes</a:t>
+              <a:t>Scaling Factors </a:t>
+            </a:r>
+            <a:r>
+              <a:rPr lang="en-US" smtClean="0"/>
+              <a:t>convert </a:t>
+            </a:r>
+            <a:r>
+              <a:rPr lang="en-US" i="1"/>
+              <a:t>F</a:t>
+            </a:r>
+            <a:r>
+              <a:rPr lang="en-US"/>
+              <a:t>(</a:t>
+            </a:r>
+            <a:r>
+              <a:rPr lang="en-US" i="1"/>
+              <a:t>t</a:t>
+            </a:r>
+            <a:r>
+              <a:rPr lang="en-US"/>
+              <a:t>) </a:t>
+            </a:r>
+            <a:r>
+              <a:rPr lang="en-US" smtClean="0"/>
+              <a:t>and </a:t>
+            </a:r>
+            <a:r>
+              <a:rPr lang="en-US" i="1" dirty="0" smtClean="0"/>
+              <a:t>S</a:t>
+            </a:r>
+            <a:r>
+              <a:rPr lang="en-US" smtClean="0"/>
+              <a:t>(</a:t>
+            </a:r>
+            <a:r>
+              <a:rPr lang="en-US" i="1" dirty="0"/>
+              <a:t>t</a:t>
+            </a:r>
+            <a:r>
+              <a:rPr lang="en-US" dirty="0"/>
+              <a:t>) </a:t>
+            </a:r>
+            <a:r>
+              <a:rPr lang="en-US" dirty="0" smtClean="0"/>
+              <a:t>to Irradiance Changes</a:t>
             </a:r>
           </a:p>
           <a:p>

</xml_diff>